<commit_message>
Updated MVC explanation slide
</commit_message>
<xml_diff>
--- a/3-Build-and-deploy-ASPNET.pptx
+++ b/3-Build-and-deploy-ASPNET.pptx
@@ -214,7 +214,7 @@
           <a:p>
             <a:fld id="{0E990FE3-7537-4D15-A9F5-FDF1805FD5F8}" type="datetimeFigureOut">
               <a:rPr lang="en-US" smtClean="0"/>
-              <a:t>10/11/2013</a:t>
+              <a:t>12/8/2013</a:t>
             </a:fld>
             <a:endParaRPr lang="en-US"/>
           </a:p>
@@ -13374,130 +13374,6 @@
           <a:p>
             <a:pPr algn="ctr"/>
             <a:endParaRPr lang="en-US"/>
-          </a:p>
-        </p:txBody>
-      </p:sp>
-      <p:sp>
-        <p:nvSpPr>
-          <p:cNvPr id="14" name="Slide Number Placeholder 5"/>
-          <p:cNvSpPr txBox="1">
-            <a:spLocks/>
-          </p:cNvSpPr>
-          <p:nvPr userDrawn="1"/>
-        </p:nvSpPr>
-        <p:spPr>
-          <a:xfrm>
-            <a:off x="560798" y="6256216"/>
-            <a:ext cx="2743200" cy="365125"/>
-          </a:xfrm>
-          <a:prstGeom prst="rect">
-            <a:avLst/>
-          </a:prstGeom>
-        </p:spPr>
-        <p:txBody>
-          <a:bodyPr vert="horz" lIns="91440" tIns="45720" rIns="91440" bIns="45720" rtlCol="0" anchor="ctr"/>
-          <a:lstStyle>
-            <a:defPPr>
-              <a:defRPr lang="en-US"/>
-            </a:defPPr>
-            <a:lvl1pPr marL="0" algn="r" defTabSz="914400" rtl="0" eaLnBrk="1" latinLnBrk="0" hangingPunct="1">
-              <a:defRPr sz="2000" kern="1200">
-                <a:solidFill>
-                  <a:srgbClr val="289FD7"/>
-                </a:solidFill>
-                <a:latin typeface="+mj-lt"/>
-                <a:ea typeface="+mn-ea"/>
-                <a:cs typeface="+mn-cs"/>
-              </a:defRPr>
-            </a:lvl1pPr>
-            <a:lvl2pPr marL="457200" algn="l" defTabSz="914400" rtl="0" eaLnBrk="1" latinLnBrk="0" hangingPunct="1">
-              <a:defRPr sz="1800" kern="1200">
-                <a:solidFill>
-                  <a:schemeClr val="tx1"/>
-                </a:solidFill>
-                <a:latin typeface="+mn-lt"/>
-                <a:ea typeface="+mn-ea"/>
-                <a:cs typeface="+mn-cs"/>
-              </a:defRPr>
-            </a:lvl2pPr>
-            <a:lvl3pPr marL="914400" algn="l" defTabSz="914400" rtl="0" eaLnBrk="1" latinLnBrk="0" hangingPunct="1">
-              <a:defRPr sz="1800" kern="1200">
-                <a:solidFill>
-                  <a:schemeClr val="tx1"/>
-                </a:solidFill>
-                <a:latin typeface="+mn-lt"/>
-                <a:ea typeface="+mn-ea"/>
-                <a:cs typeface="+mn-cs"/>
-              </a:defRPr>
-            </a:lvl3pPr>
-            <a:lvl4pPr marL="1371600" algn="l" defTabSz="914400" rtl="0" eaLnBrk="1" latinLnBrk="0" hangingPunct="1">
-              <a:defRPr sz="1800" kern="1200">
-                <a:solidFill>
-                  <a:schemeClr val="tx1"/>
-                </a:solidFill>
-                <a:latin typeface="+mn-lt"/>
-                <a:ea typeface="+mn-ea"/>
-                <a:cs typeface="+mn-cs"/>
-              </a:defRPr>
-            </a:lvl4pPr>
-            <a:lvl5pPr marL="1828800" algn="l" defTabSz="914400" rtl="0" eaLnBrk="1" latinLnBrk="0" hangingPunct="1">
-              <a:defRPr sz="1800" kern="1200">
-                <a:solidFill>
-                  <a:schemeClr val="tx1"/>
-                </a:solidFill>
-                <a:latin typeface="+mn-lt"/>
-                <a:ea typeface="+mn-ea"/>
-                <a:cs typeface="+mn-cs"/>
-              </a:defRPr>
-            </a:lvl5pPr>
-            <a:lvl6pPr marL="2286000" algn="l" defTabSz="914400" rtl="0" eaLnBrk="1" latinLnBrk="0" hangingPunct="1">
-              <a:defRPr sz="1800" kern="1200">
-                <a:solidFill>
-                  <a:schemeClr val="tx1"/>
-                </a:solidFill>
-                <a:latin typeface="+mn-lt"/>
-                <a:ea typeface="+mn-ea"/>
-                <a:cs typeface="+mn-cs"/>
-              </a:defRPr>
-            </a:lvl6pPr>
-            <a:lvl7pPr marL="2743200" algn="l" defTabSz="914400" rtl="0" eaLnBrk="1" latinLnBrk="0" hangingPunct="1">
-              <a:defRPr sz="1800" kern="1200">
-                <a:solidFill>
-                  <a:schemeClr val="tx1"/>
-                </a:solidFill>
-                <a:latin typeface="+mn-lt"/>
-                <a:ea typeface="+mn-ea"/>
-                <a:cs typeface="+mn-cs"/>
-              </a:defRPr>
-            </a:lvl7pPr>
-            <a:lvl8pPr marL="3200400" algn="l" defTabSz="914400" rtl="0" eaLnBrk="1" latinLnBrk="0" hangingPunct="1">
-              <a:defRPr sz="1800" kern="1200">
-                <a:solidFill>
-                  <a:schemeClr val="tx1"/>
-                </a:solidFill>
-                <a:latin typeface="+mn-lt"/>
-                <a:ea typeface="+mn-ea"/>
-                <a:cs typeface="+mn-cs"/>
-              </a:defRPr>
-            </a:lvl8pPr>
-            <a:lvl9pPr marL="3657600" algn="l" defTabSz="914400" rtl="0" eaLnBrk="1" latinLnBrk="0" hangingPunct="1">
-              <a:defRPr sz="1800" kern="1200">
-                <a:solidFill>
-                  <a:schemeClr val="tx1"/>
-                </a:solidFill>
-                <a:latin typeface="+mn-lt"/>
-                <a:ea typeface="+mn-ea"/>
-                <a:cs typeface="+mn-cs"/>
-              </a:defRPr>
-            </a:lvl9pPr>
-          </a:lstStyle>
-          <a:p>
-            <a:pPr algn="l"/>
-            <a:r>
-              <a:rPr lang="en-US" dirty="0" smtClean="0"/>
-              <a:t>Windows Azure</a:t>
-            </a:r>
-            <a:endParaRPr lang="en-US" dirty="0"/>
           </a:p>
         </p:txBody>
       </p:sp>
@@ -14319,138 +14195,6 @@
       </p:sp>
       <p:sp>
         <p:nvSpPr>
-          <p:cNvPr id="14" name="Slide Number Placeholder 5"/>
-          <p:cNvSpPr txBox="1">
-            <a:spLocks/>
-          </p:cNvSpPr>
-          <p:nvPr userDrawn="1"/>
-        </p:nvSpPr>
-        <p:spPr>
-          <a:xfrm>
-            <a:off x="560798" y="6256216"/>
-            <a:ext cx="2743200" cy="365125"/>
-          </a:xfrm>
-          <a:prstGeom prst="rect">
-            <a:avLst/>
-          </a:prstGeom>
-        </p:spPr>
-        <p:txBody>
-          <a:bodyPr vert="horz" lIns="91440" tIns="45720" rIns="91440" bIns="45720" rtlCol="0" anchor="ctr"/>
-          <a:lstStyle>
-            <a:defPPr>
-              <a:defRPr lang="en-US"/>
-            </a:defPPr>
-            <a:lvl1pPr marL="0" algn="r" defTabSz="914400" rtl="0" eaLnBrk="1" latinLnBrk="0" hangingPunct="1">
-              <a:defRPr sz="2000" kern="1200">
-                <a:solidFill>
-                  <a:srgbClr val="289FD7"/>
-                </a:solidFill>
-                <a:latin typeface="+mj-lt"/>
-                <a:ea typeface="+mn-ea"/>
-                <a:cs typeface="+mn-cs"/>
-              </a:defRPr>
-            </a:lvl1pPr>
-            <a:lvl2pPr marL="457200" algn="l" defTabSz="914400" rtl="0" eaLnBrk="1" latinLnBrk="0" hangingPunct="1">
-              <a:defRPr sz="1800" kern="1200">
-                <a:solidFill>
-                  <a:schemeClr val="tx1"/>
-                </a:solidFill>
-                <a:latin typeface="+mn-lt"/>
-                <a:ea typeface="+mn-ea"/>
-                <a:cs typeface="+mn-cs"/>
-              </a:defRPr>
-            </a:lvl2pPr>
-            <a:lvl3pPr marL="914400" algn="l" defTabSz="914400" rtl="0" eaLnBrk="1" latinLnBrk="0" hangingPunct="1">
-              <a:defRPr sz="1800" kern="1200">
-                <a:solidFill>
-                  <a:schemeClr val="tx1"/>
-                </a:solidFill>
-                <a:latin typeface="+mn-lt"/>
-                <a:ea typeface="+mn-ea"/>
-                <a:cs typeface="+mn-cs"/>
-              </a:defRPr>
-            </a:lvl3pPr>
-            <a:lvl4pPr marL="1371600" algn="l" defTabSz="914400" rtl="0" eaLnBrk="1" latinLnBrk="0" hangingPunct="1">
-              <a:defRPr sz="1800" kern="1200">
-                <a:solidFill>
-                  <a:schemeClr val="tx1"/>
-                </a:solidFill>
-                <a:latin typeface="+mn-lt"/>
-                <a:ea typeface="+mn-ea"/>
-                <a:cs typeface="+mn-cs"/>
-              </a:defRPr>
-            </a:lvl4pPr>
-            <a:lvl5pPr marL="1828800" algn="l" defTabSz="914400" rtl="0" eaLnBrk="1" latinLnBrk="0" hangingPunct="1">
-              <a:defRPr sz="1800" kern="1200">
-                <a:solidFill>
-                  <a:schemeClr val="tx1"/>
-                </a:solidFill>
-                <a:latin typeface="+mn-lt"/>
-                <a:ea typeface="+mn-ea"/>
-                <a:cs typeface="+mn-cs"/>
-              </a:defRPr>
-            </a:lvl5pPr>
-            <a:lvl6pPr marL="2286000" algn="l" defTabSz="914400" rtl="0" eaLnBrk="1" latinLnBrk="0" hangingPunct="1">
-              <a:defRPr sz="1800" kern="1200">
-                <a:solidFill>
-                  <a:schemeClr val="tx1"/>
-                </a:solidFill>
-                <a:latin typeface="+mn-lt"/>
-                <a:ea typeface="+mn-ea"/>
-                <a:cs typeface="+mn-cs"/>
-              </a:defRPr>
-            </a:lvl6pPr>
-            <a:lvl7pPr marL="2743200" algn="l" defTabSz="914400" rtl="0" eaLnBrk="1" latinLnBrk="0" hangingPunct="1">
-              <a:defRPr sz="1800" kern="1200">
-                <a:solidFill>
-                  <a:schemeClr val="tx1"/>
-                </a:solidFill>
-                <a:latin typeface="+mn-lt"/>
-                <a:ea typeface="+mn-ea"/>
-                <a:cs typeface="+mn-cs"/>
-              </a:defRPr>
-            </a:lvl7pPr>
-            <a:lvl8pPr marL="3200400" algn="l" defTabSz="914400" rtl="0" eaLnBrk="1" latinLnBrk="0" hangingPunct="1">
-              <a:defRPr sz="1800" kern="1200">
-                <a:solidFill>
-                  <a:schemeClr val="tx1"/>
-                </a:solidFill>
-                <a:latin typeface="+mn-lt"/>
-                <a:ea typeface="+mn-ea"/>
-                <a:cs typeface="+mn-cs"/>
-              </a:defRPr>
-            </a:lvl8pPr>
-            <a:lvl9pPr marL="3657600" algn="l" defTabSz="914400" rtl="0" eaLnBrk="1" latinLnBrk="0" hangingPunct="1">
-              <a:defRPr sz="1800" kern="1200">
-                <a:solidFill>
-                  <a:schemeClr val="tx1"/>
-                </a:solidFill>
-                <a:latin typeface="+mn-lt"/>
-                <a:ea typeface="+mn-ea"/>
-                <a:cs typeface="+mn-cs"/>
-              </a:defRPr>
-            </a:lvl9pPr>
-          </a:lstStyle>
-          <a:p>
-            <a:pPr algn="l"/>
-            <a:r>
-              <a:rPr lang="en-US" dirty="0" smtClean="0">
-                <a:solidFill>
-                  <a:srgbClr val="BDCD2C"/>
-                </a:solidFill>
-              </a:rPr>
-              <a:t>Windows Azure</a:t>
-            </a:r>
-            <a:endParaRPr lang="en-US" dirty="0">
-              <a:solidFill>
-                <a:srgbClr val="BDCD2C"/>
-              </a:solidFill>
-            </a:endParaRPr>
-          </a:p>
-        </p:txBody>
-      </p:sp>
-      <p:sp>
-        <p:nvSpPr>
           <p:cNvPr id="15" name="Rectangle 14"/>
           <p:cNvSpPr/>
           <p:nvPr userDrawn="1"/>
@@ -15261,138 +15005,6 @@
           <a:p>
             <a:pPr algn="ctr"/>
             <a:endParaRPr lang="en-US"/>
-          </a:p>
-        </p:txBody>
-      </p:sp>
-      <p:sp>
-        <p:nvSpPr>
-          <p:cNvPr id="14" name="Slide Number Placeholder 5"/>
-          <p:cNvSpPr txBox="1">
-            <a:spLocks/>
-          </p:cNvSpPr>
-          <p:nvPr userDrawn="1"/>
-        </p:nvSpPr>
-        <p:spPr>
-          <a:xfrm>
-            <a:off x="560798" y="6256216"/>
-            <a:ext cx="2743200" cy="365125"/>
-          </a:xfrm>
-          <a:prstGeom prst="rect">
-            <a:avLst/>
-          </a:prstGeom>
-        </p:spPr>
-        <p:txBody>
-          <a:bodyPr vert="horz" lIns="91440" tIns="45720" rIns="91440" bIns="45720" rtlCol="0" anchor="ctr"/>
-          <a:lstStyle>
-            <a:defPPr>
-              <a:defRPr lang="en-US"/>
-            </a:defPPr>
-            <a:lvl1pPr marL="0" algn="r" defTabSz="914400" rtl="0" eaLnBrk="1" latinLnBrk="0" hangingPunct="1">
-              <a:defRPr sz="2000" kern="1200">
-                <a:solidFill>
-                  <a:srgbClr val="289FD7"/>
-                </a:solidFill>
-                <a:latin typeface="+mj-lt"/>
-                <a:ea typeface="+mn-ea"/>
-                <a:cs typeface="+mn-cs"/>
-              </a:defRPr>
-            </a:lvl1pPr>
-            <a:lvl2pPr marL="457200" algn="l" defTabSz="914400" rtl="0" eaLnBrk="1" latinLnBrk="0" hangingPunct="1">
-              <a:defRPr sz="1800" kern="1200">
-                <a:solidFill>
-                  <a:schemeClr val="tx1"/>
-                </a:solidFill>
-                <a:latin typeface="+mn-lt"/>
-                <a:ea typeface="+mn-ea"/>
-                <a:cs typeface="+mn-cs"/>
-              </a:defRPr>
-            </a:lvl2pPr>
-            <a:lvl3pPr marL="914400" algn="l" defTabSz="914400" rtl="0" eaLnBrk="1" latinLnBrk="0" hangingPunct="1">
-              <a:defRPr sz="1800" kern="1200">
-                <a:solidFill>
-                  <a:schemeClr val="tx1"/>
-                </a:solidFill>
-                <a:latin typeface="+mn-lt"/>
-                <a:ea typeface="+mn-ea"/>
-                <a:cs typeface="+mn-cs"/>
-              </a:defRPr>
-            </a:lvl3pPr>
-            <a:lvl4pPr marL="1371600" algn="l" defTabSz="914400" rtl="0" eaLnBrk="1" latinLnBrk="0" hangingPunct="1">
-              <a:defRPr sz="1800" kern="1200">
-                <a:solidFill>
-                  <a:schemeClr val="tx1"/>
-                </a:solidFill>
-                <a:latin typeface="+mn-lt"/>
-                <a:ea typeface="+mn-ea"/>
-                <a:cs typeface="+mn-cs"/>
-              </a:defRPr>
-            </a:lvl4pPr>
-            <a:lvl5pPr marL="1828800" algn="l" defTabSz="914400" rtl="0" eaLnBrk="1" latinLnBrk="0" hangingPunct="1">
-              <a:defRPr sz="1800" kern="1200">
-                <a:solidFill>
-                  <a:schemeClr val="tx1"/>
-                </a:solidFill>
-                <a:latin typeface="+mn-lt"/>
-                <a:ea typeface="+mn-ea"/>
-                <a:cs typeface="+mn-cs"/>
-              </a:defRPr>
-            </a:lvl5pPr>
-            <a:lvl6pPr marL="2286000" algn="l" defTabSz="914400" rtl="0" eaLnBrk="1" latinLnBrk="0" hangingPunct="1">
-              <a:defRPr sz="1800" kern="1200">
-                <a:solidFill>
-                  <a:schemeClr val="tx1"/>
-                </a:solidFill>
-                <a:latin typeface="+mn-lt"/>
-                <a:ea typeface="+mn-ea"/>
-                <a:cs typeface="+mn-cs"/>
-              </a:defRPr>
-            </a:lvl6pPr>
-            <a:lvl7pPr marL="2743200" algn="l" defTabSz="914400" rtl="0" eaLnBrk="1" latinLnBrk="0" hangingPunct="1">
-              <a:defRPr sz="1800" kern="1200">
-                <a:solidFill>
-                  <a:schemeClr val="tx1"/>
-                </a:solidFill>
-                <a:latin typeface="+mn-lt"/>
-                <a:ea typeface="+mn-ea"/>
-                <a:cs typeface="+mn-cs"/>
-              </a:defRPr>
-            </a:lvl7pPr>
-            <a:lvl8pPr marL="3200400" algn="l" defTabSz="914400" rtl="0" eaLnBrk="1" latinLnBrk="0" hangingPunct="1">
-              <a:defRPr sz="1800" kern="1200">
-                <a:solidFill>
-                  <a:schemeClr val="tx1"/>
-                </a:solidFill>
-                <a:latin typeface="+mn-lt"/>
-                <a:ea typeface="+mn-ea"/>
-                <a:cs typeface="+mn-cs"/>
-              </a:defRPr>
-            </a:lvl8pPr>
-            <a:lvl9pPr marL="3657600" algn="l" defTabSz="914400" rtl="0" eaLnBrk="1" latinLnBrk="0" hangingPunct="1">
-              <a:defRPr sz="1800" kern="1200">
-                <a:solidFill>
-                  <a:schemeClr val="tx1"/>
-                </a:solidFill>
-                <a:latin typeface="+mn-lt"/>
-                <a:ea typeface="+mn-ea"/>
-                <a:cs typeface="+mn-cs"/>
-              </a:defRPr>
-            </a:lvl9pPr>
-          </a:lstStyle>
-          <a:p>
-            <a:pPr algn="l"/>
-            <a:r>
-              <a:rPr lang="en-US" dirty="0" smtClean="0">
-                <a:solidFill>
-                  <a:srgbClr val="617081"/>
-                </a:solidFill>
-              </a:rPr>
-              <a:t>Windows Azure</a:t>
-            </a:r>
-            <a:endParaRPr lang="en-US" dirty="0">
-              <a:solidFill>
-                <a:srgbClr val="617081"/>
-              </a:solidFill>
-            </a:endParaRPr>
           </a:p>
         </p:txBody>
       </p:sp>
@@ -16214,138 +15826,6 @@
       </p:sp>
       <p:sp>
         <p:nvSpPr>
-          <p:cNvPr id="14" name="Slide Number Placeholder 5"/>
-          <p:cNvSpPr txBox="1">
-            <a:spLocks/>
-          </p:cNvSpPr>
-          <p:nvPr userDrawn="1"/>
-        </p:nvSpPr>
-        <p:spPr>
-          <a:xfrm>
-            <a:off x="560798" y="6256216"/>
-            <a:ext cx="2743200" cy="365125"/>
-          </a:xfrm>
-          <a:prstGeom prst="rect">
-            <a:avLst/>
-          </a:prstGeom>
-        </p:spPr>
-        <p:txBody>
-          <a:bodyPr vert="horz" lIns="91440" tIns="45720" rIns="91440" bIns="45720" rtlCol="0" anchor="ctr"/>
-          <a:lstStyle>
-            <a:defPPr>
-              <a:defRPr lang="en-US"/>
-            </a:defPPr>
-            <a:lvl1pPr marL="0" algn="r" defTabSz="914400" rtl="0" eaLnBrk="1" latinLnBrk="0" hangingPunct="1">
-              <a:defRPr sz="2000" kern="1200">
-                <a:solidFill>
-                  <a:srgbClr val="289FD7"/>
-                </a:solidFill>
-                <a:latin typeface="+mj-lt"/>
-                <a:ea typeface="+mn-ea"/>
-                <a:cs typeface="+mn-cs"/>
-              </a:defRPr>
-            </a:lvl1pPr>
-            <a:lvl2pPr marL="457200" algn="l" defTabSz="914400" rtl="0" eaLnBrk="1" latinLnBrk="0" hangingPunct="1">
-              <a:defRPr sz="1800" kern="1200">
-                <a:solidFill>
-                  <a:schemeClr val="tx1"/>
-                </a:solidFill>
-                <a:latin typeface="+mn-lt"/>
-                <a:ea typeface="+mn-ea"/>
-                <a:cs typeface="+mn-cs"/>
-              </a:defRPr>
-            </a:lvl2pPr>
-            <a:lvl3pPr marL="914400" algn="l" defTabSz="914400" rtl="0" eaLnBrk="1" latinLnBrk="0" hangingPunct="1">
-              <a:defRPr sz="1800" kern="1200">
-                <a:solidFill>
-                  <a:schemeClr val="tx1"/>
-                </a:solidFill>
-                <a:latin typeface="+mn-lt"/>
-                <a:ea typeface="+mn-ea"/>
-                <a:cs typeface="+mn-cs"/>
-              </a:defRPr>
-            </a:lvl3pPr>
-            <a:lvl4pPr marL="1371600" algn="l" defTabSz="914400" rtl="0" eaLnBrk="1" latinLnBrk="0" hangingPunct="1">
-              <a:defRPr sz="1800" kern="1200">
-                <a:solidFill>
-                  <a:schemeClr val="tx1"/>
-                </a:solidFill>
-                <a:latin typeface="+mn-lt"/>
-                <a:ea typeface="+mn-ea"/>
-                <a:cs typeface="+mn-cs"/>
-              </a:defRPr>
-            </a:lvl4pPr>
-            <a:lvl5pPr marL="1828800" algn="l" defTabSz="914400" rtl="0" eaLnBrk="1" latinLnBrk="0" hangingPunct="1">
-              <a:defRPr sz="1800" kern="1200">
-                <a:solidFill>
-                  <a:schemeClr val="tx1"/>
-                </a:solidFill>
-                <a:latin typeface="+mn-lt"/>
-                <a:ea typeface="+mn-ea"/>
-                <a:cs typeface="+mn-cs"/>
-              </a:defRPr>
-            </a:lvl5pPr>
-            <a:lvl6pPr marL="2286000" algn="l" defTabSz="914400" rtl="0" eaLnBrk="1" latinLnBrk="0" hangingPunct="1">
-              <a:defRPr sz="1800" kern="1200">
-                <a:solidFill>
-                  <a:schemeClr val="tx1"/>
-                </a:solidFill>
-                <a:latin typeface="+mn-lt"/>
-                <a:ea typeface="+mn-ea"/>
-                <a:cs typeface="+mn-cs"/>
-              </a:defRPr>
-            </a:lvl6pPr>
-            <a:lvl7pPr marL="2743200" algn="l" defTabSz="914400" rtl="0" eaLnBrk="1" latinLnBrk="0" hangingPunct="1">
-              <a:defRPr sz="1800" kern="1200">
-                <a:solidFill>
-                  <a:schemeClr val="tx1"/>
-                </a:solidFill>
-                <a:latin typeface="+mn-lt"/>
-                <a:ea typeface="+mn-ea"/>
-                <a:cs typeface="+mn-cs"/>
-              </a:defRPr>
-            </a:lvl7pPr>
-            <a:lvl8pPr marL="3200400" algn="l" defTabSz="914400" rtl="0" eaLnBrk="1" latinLnBrk="0" hangingPunct="1">
-              <a:defRPr sz="1800" kern="1200">
-                <a:solidFill>
-                  <a:schemeClr val="tx1"/>
-                </a:solidFill>
-                <a:latin typeface="+mn-lt"/>
-                <a:ea typeface="+mn-ea"/>
-                <a:cs typeface="+mn-cs"/>
-              </a:defRPr>
-            </a:lvl8pPr>
-            <a:lvl9pPr marL="3657600" algn="l" defTabSz="914400" rtl="0" eaLnBrk="1" latinLnBrk="0" hangingPunct="1">
-              <a:defRPr sz="1800" kern="1200">
-                <a:solidFill>
-                  <a:schemeClr val="tx1"/>
-                </a:solidFill>
-                <a:latin typeface="+mn-lt"/>
-                <a:ea typeface="+mn-ea"/>
-                <a:cs typeface="+mn-cs"/>
-              </a:defRPr>
-            </a:lvl9pPr>
-          </a:lstStyle>
-          <a:p>
-            <a:pPr algn="l"/>
-            <a:r>
-              <a:rPr lang="en-US" dirty="0" smtClean="0">
-                <a:solidFill>
-                  <a:srgbClr val="0171B0"/>
-                </a:solidFill>
-              </a:rPr>
-              <a:t>Windows Azure</a:t>
-            </a:r>
-            <a:endParaRPr lang="en-US" dirty="0">
-              <a:solidFill>
-                <a:srgbClr val="0171B0"/>
-              </a:solidFill>
-            </a:endParaRPr>
-          </a:p>
-        </p:txBody>
-      </p:sp>
-      <p:sp>
-        <p:nvSpPr>
           <p:cNvPr id="15" name="Rectangle 14"/>
           <p:cNvSpPr/>
           <p:nvPr userDrawn="1"/>
@@ -17161,138 +16641,6 @@
       </p:sp>
       <p:sp>
         <p:nvSpPr>
-          <p:cNvPr id="14" name="Slide Number Placeholder 5"/>
-          <p:cNvSpPr txBox="1">
-            <a:spLocks/>
-          </p:cNvSpPr>
-          <p:nvPr userDrawn="1"/>
-        </p:nvSpPr>
-        <p:spPr>
-          <a:xfrm>
-            <a:off x="560798" y="6256216"/>
-            <a:ext cx="2743200" cy="365125"/>
-          </a:xfrm>
-          <a:prstGeom prst="rect">
-            <a:avLst/>
-          </a:prstGeom>
-        </p:spPr>
-        <p:txBody>
-          <a:bodyPr vert="horz" lIns="91440" tIns="45720" rIns="91440" bIns="45720" rtlCol="0" anchor="ctr"/>
-          <a:lstStyle>
-            <a:defPPr>
-              <a:defRPr lang="en-US"/>
-            </a:defPPr>
-            <a:lvl1pPr marL="0" algn="r" defTabSz="914400" rtl="0" eaLnBrk="1" latinLnBrk="0" hangingPunct="1">
-              <a:defRPr sz="2000" kern="1200">
-                <a:solidFill>
-                  <a:srgbClr val="289FD7"/>
-                </a:solidFill>
-                <a:latin typeface="+mj-lt"/>
-                <a:ea typeface="+mn-ea"/>
-                <a:cs typeface="+mn-cs"/>
-              </a:defRPr>
-            </a:lvl1pPr>
-            <a:lvl2pPr marL="457200" algn="l" defTabSz="914400" rtl="0" eaLnBrk="1" latinLnBrk="0" hangingPunct="1">
-              <a:defRPr sz="1800" kern="1200">
-                <a:solidFill>
-                  <a:schemeClr val="tx1"/>
-                </a:solidFill>
-                <a:latin typeface="+mn-lt"/>
-                <a:ea typeface="+mn-ea"/>
-                <a:cs typeface="+mn-cs"/>
-              </a:defRPr>
-            </a:lvl2pPr>
-            <a:lvl3pPr marL="914400" algn="l" defTabSz="914400" rtl="0" eaLnBrk="1" latinLnBrk="0" hangingPunct="1">
-              <a:defRPr sz="1800" kern="1200">
-                <a:solidFill>
-                  <a:schemeClr val="tx1"/>
-                </a:solidFill>
-                <a:latin typeface="+mn-lt"/>
-                <a:ea typeface="+mn-ea"/>
-                <a:cs typeface="+mn-cs"/>
-              </a:defRPr>
-            </a:lvl3pPr>
-            <a:lvl4pPr marL="1371600" algn="l" defTabSz="914400" rtl="0" eaLnBrk="1" latinLnBrk="0" hangingPunct="1">
-              <a:defRPr sz="1800" kern="1200">
-                <a:solidFill>
-                  <a:schemeClr val="tx1"/>
-                </a:solidFill>
-                <a:latin typeface="+mn-lt"/>
-                <a:ea typeface="+mn-ea"/>
-                <a:cs typeface="+mn-cs"/>
-              </a:defRPr>
-            </a:lvl4pPr>
-            <a:lvl5pPr marL="1828800" algn="l" defTabSz="914400" rtl="0" eaLnBrk="1" latinLnBrk="0" hangingPunct="1">
-              <a:defRPr sz="1800" kern="1200">
-                <a:solidFill>
-                  <a:schemeClr val="tx1"/>
-                </a:solidFill>
-                <a:latin typeface="+mn-lt"/>
-                <a:ea typeface="+mn-ea"/>
-                <a:cs typeface="+mn-cs"/>
-              </a:defRPr>
-            </a:lvl5pPr>
-            <a:lvl6pPr marL="2286000" algn="l" defTabSz="914400" rtl="0" eaLnBrk="1" latinLnBrk="0" hangingPunct="1">
-              <a:defRPr sz="1800" kern="1200">
-                <a:solidFill>
-                  <a:schemeClr val="tx1"/>
-                </a:solidFill>
-                <a:latin typeface="+mn-lt"/>
-                <a:ea typeface="+mn-ea"/>
-                <a:cs typeface="+mn-cs"/>
-              </a:defRPr>
-            </a:lvl6pPr>
-            <a:lvl7pPr marL="2743200" algn="l" defTabSz="914400" rtl="0" eaLnBrk="1" latinLnBrk="0" hangingPunct="1">
-              <a:defRPr sz="1800" kern="1200">
-                <a:solidFill>
-                  <a:schemeClr val="tx1"/>
-                </a:solidFill>
-                <a:latin typeface="+mn-lt"/>
-                <a:ea typeface="+mn-ea"/>
-                <a:cs typeface="+mn-cs"/>
-              </a:defRPr>
-            </a:lvl7pPr>
-            <a:lvl8pPr marL="3200400" algn="l" defTabSz="914400" rtl="0" eaLnBrk="1" latinLnBrk="0" hangingPunct="1">
-              <a:defRPr sz="1800" kern="1200">
-                <a:solidFill>
-                  <a:schemeClr val="tx1"/>
-                </a:solidFill>
-                <a:latin typeface="+mn-lt"/>
-                <a:ea typeface="+mn-ea"/>
-                <a:cs typeface="+mn-cs"/>
-              </a:defRPr>
-            </a:lvl8pPr>
-            <a:lvl9pPr marL="3657600" algn="l" defTabSz="914400" rtl="0" eaLnBrk="1" latinLnBrk="0" hangingPunct="1">
-              <a:defRPr sz="1800" kern="1200">
-                <a:solidFill>
-                  <a:schemeClr val="tx1"/>
-                </a:solidFill>
-                <a:latin typeface="+mn-lt"/>
-                <a:ea typeface="+mn-ea"/>
-                <a:cs typeface="+mn-cs"/>
-              </a:defRPr>
-            </a:lvl9pPr>
-          </a:lstStyle>
-          <a:p>
-            <a:pPr algn="l"/>
-            <a:r>
-              <a:rPr lang="en-US" dirty="0" smtClean="0">
-                <a:solidFill>
-                  <a:srgbClr val="289FD7"/>
-                </a:solidFill>
-              </a:rPr>
-              <a:t>Windows Azure</a:t>
-            </a:r>
-            <a:endParaRPr lang="en-US" dirty="0">
-              <a:solidFill>
-                <a:srgbClr val="289FD7"/>
-              </a:solidFill>
-            </a:endParaRPr>
-          </a:p>
-        </p:txBody>
-      </p:sp>
-      <p:sp>
-        <p:nvSpPr>
           <p:cNvPr id="15" name="Rectangle 14"/>
           <p:cNvSpPr/>
           <p:nvPr userDrawn="1"/>
@@ -18108,138 +17456,6 @@
       </p:sp>
       <p:sp>
         <p:nvSpPr>
-          <p:cNvPr id="14" name="Slide Number Placeholder 5"/>
-          <p:cNvSpPr txBox="1">
-            <a:spLocks/>
-          </p:cNvSpPr>
-          <p:nvPr userDrawn="1"/>
-        </p:nvSpPr>
-        <p:spPr>
-          <a:xfrm>
-            <a:off x="560798" y="6256216"/>
-            <a:ext cx="2743200" cy="365125"/>
-          </a:xfrm>
-          <a:prstGeom prst="rect">
-            <a:avLst/>
-          </a:prstGeom>
-        </p:spPr>
-        <p:txBody>
-          <a:bodyPr vert="horz" lIns="91440" tIns="45720" rIns="91440" bIns="45720" rtlCol="0" anchor="ctr"/>
-          <a:lstStyle>
-            <a:defPPr>
-              <a:defRPr lang="en-US"/>
-            </a:defPPr>
-            <a:lvl1pPr marL="0" algn="r" defTabSz="914400" rtl="0" eaLnBrk="1" latinLnBrk="0" hangingPunct="1">
-              <a:defRPr sz="2000" kern="1200">
-                <a:solidFill>
-                  <a:srgbClr val="289FD7"/>
-                </a:solidFill>
-                <a:latin typeface="+mj-lt"/>
-                <a:ea typeface="+mn-ea"/>
-                <a:cs typeface="+mn-cs"/>
-              </a:defRPr>
-            </a:lvl1pPr>
-            <a:lvl2pPr marL="457200" algn="l" defTabSz="914400" rtl="0" eaLnBrk="1" latinLnBrk="0" hangingPunct="1">
-              <a:defRPr sz="1800" kern="1200">
-                <a:solidFill>
-                  <a:schemeClr val="tx1"/>
-                </a:solidFill>
-                <a:latin typeface="+mn-lt"/>
-                <a:ea typeface="+mn-ea"/>
-                <a:cs typeface="+mn-cs"/>
-              </a:defRPr>
-            </a:lvl2pPr>
-            <a:lvl3pPr marL="914400" algn="l" defTabSz="914400" rtl="0" eaLnBrk="1" latinLnBrk="0" hangingPunct="1">
-              <a:defRPr sz="1800" kern="1200">
-                <a:solidFill>
-                  <a:schemeClr val="tx1"/>
-                </a:solidFill>
-                <a:latin typeface="+mn-lt"/>
-                <a:ea typeface="+mn-ea"/>
-                <a:cs typeface="+mn-cs"/>
-              </a:defRPr>
-            </a:lvl3pPr>
-            <a:lvl4pPr marL="1371600" algn="l" defTabSz="914400" rtl="0" eaLnBrk="1" latinLnBrk="0" hangingPunct="1">
-              <a:defRPr sz="1800" kern="1200">
-                <a:solidFill>
-                  <a:schemeClr val="tx1"/>
-                </a:solidFill>
-                <a:latin typeface="+mn-lt"/>
-                <a:ea typeface="+mn-ea"/>
-                <a:cs typeface="+mn-cs"/>
-              </a:defRPr>
-            </a:lvl4pPr>
-            <a:lvl5pPr marL="1828800" algn="l" defTabSz="914400" rtl="0" eaLnBrk="1" latinLnBrk="0" hangingPunct="1">
-              <a:defRPr sz="1800" kern="1200">
-                <a:solidFill>
-                  <a:schemeClr val="tx1"/>
-                </a:solidFill>
-                <a:latin typeface="+mn-lt"/>
-                <a:ea typeface="+mn-ea"/>
-                <a:cs typeface="+mn-cs"/>
-              </a:defRPr>
-            </a:lvl5pPr>
-            <a:lvl6pPr marL="2286000" algn="l" defTabSz="914400" rtl="0" eaLnBrk="1" latinLnBrk="0" hangingPunct="1">
-              <a:defRPr sz="1800" kern="1200">
-                <a:solidFill>
-                  <a:schemeClr val="tx1"/>
-                </a:solidFill>
-                <a:latin typeface="+mn-lt"/>
-                <a:ea typeface="+mn-ea"/>
-                <a:cs typeface="+mn-cs"/>
-              </a:defRPr>
-            </a:lvl6pPr>
-            <a:lvl7pPr marL="2743200" algn="l" defTabSz="914400" rtl="0" eaLnBrk="1" latinLnBrk="0" hangingPunct="1">
-              <a:defRPr sz="1800" kern="1200">
-                <a:solidFill>
-                  <a:schemeClr val="tx1"/>
-                </a:solidFill>
-                <a:latin typeface="+mn-lt"/>
-                <a:ea typeface="+mn-ea"/>
-                <a:cs typeface="+mn-cs"/>
-              </a:defRPr>
-            </a:lvl7pPr>
-            <a:lvl8pPr marL="3200400" algn="l" defTabSz="914400" rtl="0" eaLnBrk="1" latinLnBrk="0" hangingPunct="1">
-              <a:defRPr sz="1800" kern="1200">
-                <a:solidFill>
-                  <a:schemeClr val="tx1"/>
-                </a:solidFill>
-                <a:latin typeface="+mn-lt"/>
-                <a:ea typeface="+mn-ea"/>
-                <a:cs typeface="+mn-cs"/>
-              </a:defRPr>
-            </a:lvl8pPr>
-            <a:lvl9pPr marL="3657600" algn="l" defTabSz="914400" rtl="0" eaLnBrk="1" latinLnBrk="0" hangingPunct="1">
-              <a:defRPr sz="1800" kern="1200">
-                <a:solidFill>
-                  <a:schemeClr val="tx1"/>
-                </a:solidFill>
-                <a:latin typeface="+mn-lt"/>
-                <a:ea typeface="+mn-ea"/>
-                <a:cs typeface="+mn-cs"/>
-              </a:defRPr>
-            </a:lvl9pPr>
-          </a:lstStyle>
-          <a:p>
-            <a:pPr algn="l"/>
-            <a:r>
-              <a:rPr lang="en-US" dirty="0" smtClean="0">
-                <a:solidFill>
-                  <a:srgbClr val="617081"/>
-                </a:solidFill>
-              </a:rPr>
-              <a:t>Windows Azure</a:t>
-            </a:r>
-            <a:endParaRPr lang="en-US" dirty="0">
-              <a:solidFill>
-                <a:srgbClr val="617081"/>
-              </a:solidFill>
-            </a:endParaRPr>
-          </a:p>
-        </p:txBody>
-      </p:sp>
-      <p:sp>
-        <p:nvSpPr>
           <p:cNvPr id="15" name="Rectangle 14"/>
           <p:cNvSpPr/>
           <p:nvPr userDrawn="1"/>
@@ -18851,6 +18067,13 @@
   <p:clrMapOvr>
     <a:masterClrMapping/>
   </p:clrMapOvr>
+  <p:timing>
+    <p:tnLst>
+      <p:par>
+        <p:cTn id="1" dur="indefinite" restart="never" nodeType="tmRoot"/>
+      </p:par>
+    </p:tnLst>
+  </p:timing>
 </p:sld>
 </file>
 
@@ -19983,13 +19206,13 @@
             <a:spLocks noGrp="1"/>
           </p:cNvSpPr>
           <p:nvPr>
-            <p:ph type="title"/>
+            <p:ph type="title" idx="4294967295"/>
           </p:nvPr>
         </p:nvSpPr>
         <p:spPr>
           <a:xfrm>
-            <a:off x="665958" y="153196"/>
-            <a:ext cx="11079822" cy="1325563"/>
+            <a:off x="1112838" y="153988"/>
+            <a:ext cx="11079162" cy="1325562"/>
           </a:xfrm>
         </p:spPr>
         <p:txBody>
@@ -20015,7 +19238,7 @@
         <p:spPr>
           <a:xfrm>
             <a:off x="2051051" y="1121921"/>
-            <a:ext cx="7234717" cy="409168"/>
+            <a:ext cx="7437333" cy="5120310"/>
           </a:xfrm>
           <a:prstGeom prst="rect">
             <a:avLst/>
@@ -20172,8 +19395,9 @@
             </a:lvl9pPr>
           </a:lstStyle>
           <a:p>
-            <a:r>
-              <a:rPr lang="en-US" dirty="0">
+            <a:pPr algn="r"/>
+            <a:r>
+              <a:rPr lang="en-US" sz="4800" dirty="0">
                 <a:solidFill>
                   <a:srgbClr val="00AEEF">
                     <a:alpha val="99000"/>
@@ -20194,7 +19418,7 @@
         </p:nvSpPr>
         <p:spPr bwMode="auto">
           <a:xfrm rot="16200000">
-            <a:off x="5559055" y="3492962"/>
+            <a:off x="6520961" y="3492962"/>
             <a:ext cx="1293628" cy="323775"/>
           </a:xfrm>
           <a:prstGeom prst="leftArrow">
@@ -20255,7 +19479,7 @@
         </p:nvSpPr>
         <p:spPr bwMode="black">
           <a:xfrm>
-            <a:off x="5862969" y="3396429"/>
+            <a:off x="6824875" y="3396429"/>
             <a:ext cx="685800" cy="530225"/>
           </a:xfrm>
           <a:custGeom>
@@ -20716,7 +19940,7 @@
         </p:nvSpPr>
         <p:spPr bwMode="black">
           <a:xfrm>
-            <a:off x="5062869" y="5712006"/>
+            <a:off x="6024775" y="5712006"/>
             <a:ext cx="685800" cy="530225"/>
           </a:xfrm>
           <a:custGeom>
@@ -21175,7 +20399,7 @@
         </p:nvSpPr>
         <p:spPr bwMode="auto">
           <a:xfrm>
-            <a:off x="5916135" y="5778571"/>
+            <a:off x="6878041" y="5778571"/>
             <a:ext cx="501086" cy="397095"/>
           </a:xfrm>
           <a:prstGeom prst="rightArrow">
@@ -21226,708 +20450,130 @@
           </a:p>
         </p:txBody>
       </p:sp>
-      <p:grpSp>
-        <p:nvGrpSpPr>
-          <p:cNvPr id="68" name="Group 67"/>
-          <p:cNvGrpSpPr/>
+      <p:sp>
+        <p:nvSpPr>
+          <p:cNvPr id="69" name="Rectangle 68"/>
+          <p:cNvSpPr/>
           <p:nvPr/>
-        </p:nvGrpSpPr>
-        <p:grpSpPr>
+        </p:nvSpPr>
+        <p:spPr bwMode="auto">
           <a:xfrm>
-            <a:off x="5062870" y="2021960"/>
-            <a:ext cx="6117081" cy="999461"/>
-            <a:chOff x="4951412" y="1690578"/>
-            <a:chExt cx="6117081" cy="999461"/>
+            <a:off x="6024776" y="2021960"/>
+            <a:ext cx="2286000" cy="999460"/>
           </a:xfrm>
-        </p:grpSpPr>
-        <p:sp>
-          <p:nvSpPr>
-            <p:cNvPr id="69" name="Rectangle 68"/>
-            <p:cNvSpPr/>
-            <p:nvPr/>
-          </p:nvSpPr>
-          <p:spPr bwMode="auto">
-            <a:xfrm>
-              <a:off x="4951412" y="1690578"/>
-              <a:ext cx="2286000" cy="999460"/>
-            </a:xfrm>
-            <a:prstGeom prst="rect">
+          <a:prstGeom prst="rect">
+            <a:avLst/>
+          </a:prstGeom>
+          <a:solidFill>
+            <a:srgbClr val="00AEEF"/>
+          </a:solidFill>
+          <a:ln w="9525" cap="flat" cmpd="sng" algn="ctr">
+            <a:noFill/>
+            <a:prstDash val="solid"/>
+            <a:headEnd type="none" w="med" len="med"/>
+            <a:tailEnd type="none" w="med" len="med"/>
+          </a:ln>
+          <a:effectLst/>
+        </p:spPr>
+        <p:txBody>
+          <a:bodyPr vert="horz" wrap="square" lIns="91436" tIns="45718" rIns="91436" bIns="45718" numCol="1" rtlCol="0" anchor="ctr" anchorCtr="0" compatLnSpc="1">
+            <a:prstTxWarp prst="textNoShape">
               <a:avLst/>
-            </a:prstGeom>
-            <a:solidFill>
-              <a:srgbClr val="00AEEF"/>
-            </a:solidFill>
-            <a:ln w="9525" cap="flat" cmpd="sng" algn="ctr">
-              <a:noFill/>
-              <a:prstDash val="solid"/>
-              <a:headEnd type="none" w="med" len="med"/>
-              <a:tailEnd type="none" w="med" len="med"/>
-            </a:ln>
-            <a:effectLst/>
-          </p:spPr>
-          <p:txBody>
-            <a:bodyPr vert="horz" wrap="square" lIns="91436" tIns="45718" rIns="91436" bIns="45718" numCol="1" rtlCol="0" anchor="ctr" anchorCtr="0" compatLnSpc="1">
-              <a:prstTxWarp prst="textNoShape">
-                <a:avLst/>
-              </a:prstTxWarp>
-            </a:bodyPr>
-            <a:lstStyle/>
-            <a:p>
-              <a:pPr algn="ctr" defTabSz="914099" fontAlgn="base">
-                <a:spcBef>
-                  <a:spcPct val="0"/>
-                </a:spcBef>
-                <a:spcAft>
-                  <a:spcPct val="0"/>
-                </a:spcAft>
-                <a:defRPr/>
-              </a:pPr>
-              <a:r>
-                <a:rPr lang="en-US" sz="2800" kern="0" dirty="0">
-                  <a:gradFill>
-                    <a:gsLst>
-                      <a:gs pos="0">
-                        <a:srgbClr val="FFFFFF"/>
-                      </a:gs>
-                      <a:gs pos="100000">
-                        <a:srgbClr val="FFFFFF"/>
-                      </a:gs>
-                    </a:gsLst>
-                    <a:lin ang="5400000" scaled="0"/>
-                  </a:gradFill>
-                  <a:latin typeface="Segoe UI"/>
-                </a:rPr>
-                <a:t>Controller</a:t>
-              </a:r>
-            </a:p>
-          </p:txBody>
-        </p:sp>
-        <p:sp>
-          <p:nvSpPr>
-            <p:cNvPr id="70" name="Content Placeholder 2"/>
-            <p:cNvSpPr txBox="1">
-              <a:spLocks/>
-            </p:cNvSpPr>
-            <p:nvPr/>
-          </p:nvSpPr>
-          <p:spPr>
-            <a:xfrm>
-              <a:off x="7356143" y="1690579"/>
-              <a:ext cx="3712350" cy="999460"/>
-            </a:xfrm>
-            <a:prstGeom prst="rect">
+            </a:prstTxWarp>
+          </a:bodyPr>
+          <a:lstStyle/>
+          <a:p>
+            <a:pPr algn="ctr" defTabSz="914099" fontAlgn="base">
+              <a:spcBef>
+                <a:spcPct val="0"/>
+              </a:spcBef>
+              <a:spcAft>
+                <a:spcPct val="0"/>
+              </a:spcAft>
+              <a:defRPr/>
+            </a:pPr>
+            <a:r>
+              <a:rPr lang="en-US" sz="2800" kern="0" dirty="0">
+                <a:gradFill>
+                  <a:gsLst>
+                    <a:gs pos="0">
+                      <a:srgbClr val="FFFFFF"/>
+                    </a:gs>
+                    <a:gs pos="100000">
+                      <a:srgbClr val="FFFFFF"/>
+                    </a:gs>
+                  </a:gsLst>
+                  <a:lin ang="5400000" scaled="0"/>
+                </a:gradFill>
+                <a:latin typeface="Segoe UI"/>
+              </a:rPr>
+              <a:t>Controller</a:t>
+            </a:r>
+          </a:p>
+        </p:txBody>
+      </p:sp>
+      <p:sp>
+        <p:nvSpPr>
+          <p:cNvPr id="72" name="Rectangle 71"/>
+          <p:cNvSpPr/>
+          <p:nvPr/>
+        </p:nvSpPr>
+        <p:spPr bwMode="auto">
+          <a:xfrm>
+            <a:off x="6024776" y="4301665"/>
+            <a:ext cx="2286000" cy="999460"/>
+          </a:xfrm>
+          <a:prstGeom prst="rect">
+            <a:avLst/>
+          </a:prstGeom>
+          <a:solidFill>
+            <a:srgbClr val="00AEEF"/>
+          </a:solidFill>
+          <a:ln w="9525" cap="flat" cmpd="sng" algn="ctr">
+            <a:noFill/>
+            <a:prstDash val="solid"/>
+            <a:headEnd type="none" w="med" len="med"/>
+            <a:tailEnd type="none" w="med" len="med"/>
+          </a:ln>
+          <a:effectLst/>
+        </p:spPr>
+        <p:txBody>
+          <a:bodyPr vert="horz" wrap="square" lIns="91436" tIns="45718" rIns="91436" bIns="45718" numCol="1" rtlCol="0" anchor="ctr" anchorCtr="0" compatLnSpc="1">
+            <a:prstTxWarp prst="textNoShape">
               <a:avLst/>
-            </a:prstGeom>
-          </p:spPr>
-          <p:txBody>
-            <a:bodyPr vert="horz" wrap="square" lIns="0" tIns="0" rIns="0" bIns="0" rtlCol="0">
-              <a:noAutofit/>
-            </a:bodyPr>
-            <a:lstStyle>
-              <a:lvl1pPr marL="460375" indent="-460375" algn="l" defTabSz="914363" rtl="0" eaLnBrk="1" latinLnBrk="0" hangingPunct="1">
-                <a:lnSpc>
-                  <a:spcPct val="90000"/>
-                </a:lnSpc>
-                <a:spcBef>
-                  <a:spcPct val="20000"/>
-                </a:spcBef>
-                <a:buSzPct val="80000"/>
-                <a:buFont typeface="Arial" pitchFamily="34" charset="0"/>
-                <a:buChar char="•"/>
-                <a:defRPr sz="3200" kern="1200">
-                  <a:gradFill>
-                    <a:gsLst>
-                      <a:gs pos="0">
-                        <a:srgbClr val="595959"/>
-                      </a:gs>
-                      <a:gs pos="86000">
-                        <a:srgbClr val="595959"/>
-                      </a:gs>
-                    </a:gsLst>
-                    <a:lin ang="5400000" scaled="0"/>
-                  </a:gradFill>
-                  <a:latin typeface="+mn-lt"/>
-                  <a:ea typeface="+mn-ea"/>
-                  <a:cs typeface="+mn-cs"/>
-                </a:defRPr>
-              </a:lvl1pPr>
-              <a:lvl2pPr marL="855663" indent="-395288" algn="l" defTabSz="914363" rtl="0" eaLnBrk="1" latinLnBrk="0" hangingPunct="1">
-                <a:lnSpc>
-                  <a:spcPct val="90000"/>
-                </a:lnSpc>
-                <a:spcBef>
-                  <a:spcPct val="20000"/>
-                </a:spcBef>
-                <a:buSzPct val="80000"/>
-                <a:buFont typeface="Arial" pitchFamily="34" charset="0"/>
-                <a:buChar char="•"/>
-                <a:defRPr sz="2800" kern="1200">
-                  <a:gradFill>
-                    <a:gsLst>
-                      <a:gs pos="0">
-                        <a:srgbClr val="595959"/>
-                      </a:gs>
-                      <a:gs pos="86000">
-                        <a:srgbClr val="595959"/>
-                      </a:gs>
-                    </a:gsLst>
-                    <a:lin ang="5400000" scaled="0"/>
-                  </a:gradFill>
-                  <a:latin typeface="+mn-lt"/>
-                  <a:ea typeface="+mn-ea"/>
-                  <a:cs typeface="+mn-cs"/>
-                </a:defRPr>
-              </a:lvl2pPr>
-              <a:lvl3pPr marL="1258888" indent="-403225" algn="l" defTabSz="914363" rtl="0" eaLnBrk="1" latinLnBrk="0" hangingPunct="1">
-                <a:lnSpc>
-                  <a:spcPct val="90000"/>
-                </a:lnSpc>
-                <a:spcBef>
-                  <a:spcPct val="20000"/>
-                </a:spcBef>
-                <a:buSzPct val="80000"/>
-                <a:buFont typeface="Arial" pitchFamily="34" charset="0"/>
-                <a:buChar char="•"/>
-                <a:defRPr sz="2400" kern="1200">
-                  <a:gradFill>
-                    <a:gsLst>
-                      <a:gs pos="0">
-                        <a:srgbClr val="595959"/>
-                      </a:gs>
-                      <a:gs pos="86000">
-                        <a:srgbClr val="595959"/>
-                      </a:gs>
-                    </a:gsLst>
-                    <a:lin ang="5400000" scaled="0"/>
-                  </a:gradFill>
-                  <a:latin typeface="+mn-lt"/>
-                  <a:ea typeface="+mn-ea"/>
-                  <a:cs typeface="+mn-cs"/>
-                </a:defRPr>
-              </a:lvl3pPr>
-              <a:lvl4pPr marL="1604963" indent="-346075" algn="l" defTabSz="914363" rtl="0" eaLnBrk="1" latinLnBrk="0" hangingPunct="1">
-                <a:lnSpc>
-                  <a:spcPct val="90000"/>
-                </a:lnSpc>
-                <a:spcBef>
-                  <a:spcPct val="20000"/>
-                </a:spcBef>
-                <a:buSzPct val="80000"/>
-                <a:buFont typeface="Arial" pitchFamily="34" charset="0"/>
-                <a:buChar char="•"/>
-                <a:defRPr sz="2000" kern="1200">
-                  <a:gradFill>
-                    <a:gsLst>
-                      <a:gs pos="0">
-                        <a:srgbClr val="595959"/>
-                      </a:gs>
-                      <a:gs pos="86000">
-                        <a:srgbClr val="595959"/>
-                      </a:gs>
-                    </a:gsLst>
-                    <a:lin ang="5400000" scaled="0"/>
-                  </a:gradFill>
-                  <a:latin typeface="+mn-lt"/>
-                  <a:ea typeface="+mn-ea"/>
-                  <a:cs typeface="+mn-cs"/>
-                </a:defRPr>
-              </a:lvl4pPr>
-              <a:lvl5pPr marL="1941513" indent="-336550" algn="l" defTabSz="914363" rtl="0" eaLnBrk="1" latinLnBrk="0" hangingPunct="1">
-                <a:lnSpc>
-                  <a:spcPct val="90000"/>
-                </a:lnSpc>
-                <a:spcBef>
-                  <a:spcPct val="20000"/>
-                </a:spcBef>
-                <a:buSzPct val="80000"/>
-                <a:buFont typeface="Arial" pitchFamily="34" charset="0"/>
-                <a:buChar char="•"/>
-                <a:defRPr sz="2000" kern="1200">
-                  <a:gradFill>
-                    <a:gsLst>
-                      <a:gs pos="0">
-                        <a:srgbClr val="595959"/>
-                      </a:gs>
-                      <a:gs pos="86000">
-                        <a:srgbClr val="595959"/>
-                      </a:gs>
-                    </a:gsLst>
-                    <a:lin ang="5400000" scaled="0"/>
-                  </a:gradFill>
-                  <a:latin typeface="+mn-lt"/>
-                  <a:ea typeface="+mn-ea"/>
-                  <a:cs typeface="+mn-cs"/>
-                </a:defRPr>
-              </a:lvl5pPr>
-              <a:lvl6pPr marL="2514499" indent="-228591" algn="l" defTabSz="914363" rtl="0" eaLnBrk="1" latinLnBrk="0" hangingPunct="1">
-                <a:spcBef>
-                  <a:spcPct val="20000"/>
-                </a:spcBef>
-                <a:buFont typeface="Arial" pitchFamily="34" charset="0"/>
-                <a:buChar char="•"/>
-                <a:defRPr sz="2000" kern="1200">
-                  <a:solidFill>
-                    <a:schemeClr val="tx1"/>
-                  </a:solidFill>
-                  <a:latin typeface="+mn-lt"/>
-                  <a:ea typeface="+mn-ea"/>
-                  <a:cs typeface="+mn-cs"/>
-                </a:defRPr>
-              </a:lvl6pPr>
-              <a:lvl7pPr marL="2971681" indent="-228591" algn="l" defTabSz="914363" rtl="0" eaLnBrk="1" latinLnBrk="0" hangingPunct="1">
-                <a:spcBef>
-                  <a:spcPct val="20000"/>
-                </a:spcBef>
-                <a:buFont typeface="Arial" pitchFamily="34" charset="0"/>
-                <a:buChar char="•"/>
-                <a:defRPr sz="2000" kern="1200">
-                  <a:solidFill>
-                    <a:schemeClr val="tx1"/>
-                  </a:solidFill>
-                  <a:latin typeface="+mn-lt"/>
-                  <a:ea typeface="+mn-ea"/>
-                  <a:cs typeface="+mn-cs"/>
-                </a:defRPr>
-              </a:lvl7pPr>
-              <a:lvl8pPr marL="3428863" indent="-228591" algn="l" defTabSz="914363" rtl="0" eaLnBrk="1" latinLnBrk="0" hangingPunct="1">
-                <a:spcBef>
-                  <a:spcPct val="20000"/>
-                </a:spcBef>
-                <a:buFont typeface="Arial" pitchFamily="34" charset="0"/>
-                <a:buChar char="•"/>
-                <a:defRPr sz="2000" kern="1200">
-                  <a:solidFill>
-                    <a:schemeClr val="tx1"/>
-                  </a:solidFill>
-                  <a:latin typeface="+mn-lt"/>
-                  <a:ea typeface="+mn-ea"/>
-                  <a:cs typeface="+mn-cs"/>
-                </a:defRPr>
-              </a:lvl8pPr>
-              <a:lvl9pPr marL="3886045" indent="-228591" algn="l" defTabSz="914363" rtl="0" eaLnBrk="1" latinLnBrk="0" hangingPunct="1">
-                <a:spcBef>
-                  <a:spcPct val="20000"/>
-                </a:spcBef>
-                <a:buFont typeface="Arial" pitchFamily="34" charset="0"/>
-                <a:buChar char="•"/>
-                <a:defRPr sz="2000" kern="1200">
-                  <a:solidFill>
-                    <a:schemeClr val="tx1"/>
-                  </a:solidFill>
-                  <a:latin typeface="+mn-lt"/>
-                  <a:ea typeface="+mn-ea"/>
-                  <a:cs typeface="+mn-cs"/>
-                </a:defRPr>
-              </a:lvl9pPr>
-            </a:lstStyle>
-            <a:p>
-              <a:pPr marL="0" indent="0" defTabSz="685864">
-                <a:spcBef>
-                  <a:spcPts val="1200"/>
-                </a:spcBef>
-                <a:buNone/>
-                <a:defRPr/>
-              </a:pPr>
-              <a:r>
-                <a:rPr lang="en-US" sz="2400" dirty="0">
-                  <a:solidFill>
-                    <a:srgbClr val="00AEEF"/>
-                  </a:solidFill>
-                  <a:latin typeface="Segoe UI"/>
-                </a:rPr>
-                <a:t>Controller</a:t>
-              </a:r>
-            </a:p>
-            <a:p>
-              <a:pPr marL="0" lvl="1" indent="0" defTabSz="685864">
-                <a:spcBef>
-                  <a:spcPts val="600"/>
-                </a:spcBef>
-                <a:buNone/>
-                <a:defRPr/>
-              </a:pPr>
-              <a:r>
-                <a:rPr lang="en-US" sz="2000" dirty="0">
-                  <a:solidFill>
-                    <a:schemeClr val="bg1"/>
-                  </a:solidFill>
-                  <a:latin typeface="Segoe UI"/>
-                </a:rPr>
-                <a:t>Retrieves Model</a:t>
-              </a:r>
-            </a:p>
-            <a:p>
-              <a:pPr marL="0" lvl="1" indent="0" defTabSz="685864">
-                <a:spcBef>
-                  <a:spcPts val="600"/>
-                </a:spcBef>
-                <a:buNone/>
-                <a:defRPr/>
-              </a:pPr>
-              <a:r>
-                <a:rPr lang="en-US" sz="2000" dirty="0">
-                  <a:solidFill>
-                    <a:schemeClr val="bg1"/>
-                  </a:solidFill>
-                  <a:latin typeface="Segoe UI"/>
-                </a:rPr>
-                <a:t>“Does Stuff”</a:t>
-              </a:r>
-            </a:p>
-          </p:txBody>
-        </p:sp>
-      </p:grpSp>
-      <p:grpSp>
-        <p:nvGrpSpPr>
-          <p:cNvPr id="71" name="Group 70"/>
-          <p:cNvGrpSpPr/>
-          <p:nvPr/>
-        </p:nvGrpSpPr>
-        <p:grpSpPr>
-          <a:xfrm>
-            <a:off x="5062870" y="4294578"/>
-            <a:ext cx="6117081" cy="1006547"/>
-            <a:chOff x="4951412" y="3963196"/>
-            <a:chExt cx="6117081" cy="1006547"/>
-          </a:xfrm>
-        </p:grpSpPr>
-        <p:sp>
-          <p:nvSpPr>
-            <p:cNvPr id="72" name="Rectangle 71"/>
-            <p:cNvSpPr/>
-            <p:nvPr/>
-          </p:nvSpPr>
-          <p:spPr bwMode="auto">
-            <a:xfrm>
-              <a:off x="4951412" y="3970283"/>
-              <a:ext cx="2286000" cy="999460"/>
-            </a:xfrm>
-            <a:prstGeom prst="rect">
-              <a:avLst/>
-            </a:prstGeom>
-            <a:solidFill>
-              <a:srgbClr val="00AEEF"/>
-            </a:solidFill>
-            <a:ln w="9525" cap="flat" cmpd="sng" algn="ctr">
-              <a:noFill/>
-              <a:prstDash val="solid"/>
-              <a:headEnd type="none" w="med" len="med"/>
-              <a:tailEnd type="none" w="med" len="med"/>
-            </a:ln>
-            <a:effectLst/>
-          </p:spPr>
-          <p:txBody>
-            <a:bodyPr vert="horz" wrap="square" lIns="91436" tIns="45718" rIns="91436" bIns="45718" numCol="1" rtlCol="0" anchor="ctr" anchorCtr="0" compatLnSpc="1">
-              <a:prstTxWarp prst="textNoShape">
-                <a:avLst/>
-              </a:prstTxWarp>
-            </a:bodyPr>
-            <a:lstStyle/>
-            <a:p>
-              <a:pPr algn="ctr" defTabSz="914099" fontAlgn="base">
-                <a:spcBef>
-                  <a:spcPct val="0"/>
-                </a:spcBef>
-                <a:spcAft>
-                  <a:spcPct val="0"/>
-                </a:spcAft>
-                <a:defRPr/>
-              </a:pPr>
-              <a:r>
-                <a:rPr lang="en-US" sz="2800" kern="0" dirty="0">
-                  <a:gradFill>
-                    <a:gsLst>
-                      <a:gs pos="0">
-                        <a:srgbClr val="FFFFFF"/>
-                      </a:gs>
-                      <a:gs pos="100000">
-                        <a:srgbClr val="FFFFFF"/>
-                      </a:gs>
-                    </a:gsLst>
-                    <a:lin ang="5400000" scaled="0"/>
-                  </a:gradFill>
-                  <a:latin typeface="Segoe UI"/>
-                </a:rPr>
-                <a:t>View</a:t>
-              </a:r>
-            </a:p>
-          </p:txBody>
-        </p:sp>
-        <p:sp>
-          <p:nvSpPr>
-            <p:cNvPr id="73" name="Content Placeholder 2"/>
-            <p:cNvSpPr txBox="1">
-              <a:spLocks/>
-            </p:cNvSpPr>
-            <p:nvPr/>
-          </p:nvSpPr>
-          <p:spPr>
-            <a:xfrm>
-              <a:off x="7418424" y="3963196"/>
-              <a:ext cx="3650069" cy="999460"/>
-            </a:xfrm>
-            <a:prstGeom prst="rect">
-              <a:avLst/>
-            </a:prstGeom>
-          </p:spPr>
-          <p:txBody>
-            <a:bodyPr vert="horz" wrap="square" lIns="0" tIns="0" rIns="0" bIns="0" rtlCol="0">
-              <a:noAutofit/>
-            </a:bodyPr>
-            <a:lstStyle>
-              <a:lvl1pPr marL="460375" indent="-460375" algn="l" defTabSz="914363" rtl="0" eaLnBrk="1" latinLnBrk="0" hangingPunct="1">
-                <a:lnSpc>
-                  <a:spcPct val="90000"/>
-                </a:lnSpc>
-                <a:spcBef>
-                  <a:spcPct val="20000"/>
-                </a:spcBef>
-                <a:buSzPct val="80000"/>
-                <a:buFont typeface="Arial" pitchFamily="34" charset="0"/>
-                <a:buChar char="•"/>
-                <a:defRPr sz="3200" kern="1200">
-                  <a:gradFill>
-                    <a:gsLst>
-                      <a:gs pos="0">
-                        <a:srgbClr val="595959"/>
-                      </a:gs>
-                      <a:gs pos="86000">
-                        <a:srgbClr val="595959"/>
-                      </a:gs>
-                    </a:gsLst>
-                    <a:lin ang="5400000" scaled="0"/>
-                  </a:gradFill>
-                  <a:latin typeface="+mn-lt"/>
-                  <a:ea typeface="+mn-ea"/>
-                  <a:cs typeface="+mn-cs"/>
-                </a:defRPr>
-              </a:lvl1pPr>
-              <a:lvl2pPr marL="855663" indent="-395288" algn="l" defTabSz="914363" rtl="0" eaLnBrk="1" latinLnBrk="0" hangingPunct="1">
-                <a:lnSpc>
-                  <a:spcPct val="90000"/>
-                </a:lnSpc>
-                <a:spcBef>
-                  <a:spcPct val="20000"/>
-                </a:spcBef>
-                <a:buSzPct val="80000"/>
-                <a:buFont typeface="Arial" pitchFamily="34" charset="0"/>
-                <a:buChar char="•"/>
-                <a:defRPr sz="2800" kern="1200">
-                  <a:gradFill>
-                    <a:gsLst>
-                      <a:gs pos="0">
-                        <a:srgbClr val="595959"/>
-                      </a:gs>
-                      <a:gs pos="86000">
-                        <a:srgbClr val="595959"/>
-                      </a:gs>
-                    </a:gsLst>
-                    <a:lin ang="5400000" scaled="0"/>
-                  </a:gradFill>
-                  <a:latin typeface="+mn-lt"/>
-                  <a:ea typeface="+mn-ea"/>
-                  <a:cs typeface="+mn-cs"/>
-                </a:defRPr>
-              </a:lvl2pPr>
-              <a:lvl3pPr marL="1258888" indent="-403225" algn="l" defTabSz="914363" rtl="0" eaLnBrk="1" latinLnBrk="0" hangingPunct="1">
-                <a:lnSpc>
-                  <a:spcPct val="90000"/>
-                </a:lnSpc>
-                <a:spcBef>
-                  <a:spcPct val="20000"/>
-                </a:spcBef>
-                <a:buSzPct val="80000"/>
-                <a:buFont typeface="Arial" pitchFamily="34" charset="0"/>
-                <a:buChar char="•"/>
-                <a:defRPr sz="2400" kern="1200">
-                  <a:gradFill>
-                    <a:gsLst>
-                      <a:gs pos="0">
-                        <a:srgbClr val="595959"/>
-                      </a:gs>
-                      <a:gs pos="86000">
-                        <a:srgbClr val="595959"/>
-                      </a:gs>
-                    </a:gsLst>
-                    <a:lin ang="5400000" scaled="0"/>
-                  </a:gradFill>
-                  <a:latin typeface="+mn-lt"/>
-                  <a:ea typeface="+mn-ea"/>
-                  <a:cs typeface="+mn-cs"/>
-                </a:defRPr>
-              </a:lvl3pPr>
-              <a:lvl4pPr marL="1604963" indent="-346075" algn="l" defTabSz="914363" rtl="0" eaLnBrk="1" latinLnBrk="0" hangingPunct="1">
-                <a:lnSpc>
-                  <a:spcPct val="90000"/>
-                </a:lnSpc>
-                <a:spcBef>
-                  <a:spcPct val="20000"/>
-                </a:spcBef>
-                <a:buSzPct val="80000"/>
-                <a:buFont typeface="Arial" pitchFamily="34" charset="0"/>
-                <a:buChar char="•"/>
-                <a:defRPr sz="2000" kern="1200">
-                  <a:gradFill>
-                    <a:gsLst>
-                      <a:gs pos="0">
-                        <a:srgbClr val="595959"/>
-                      </a:gs>
-                      <a:gs pos="86000">
-                        <a:srgbClr val="595959"/>
-                      </a:gs>
-                    </a:gsLst>
-                    <a:lin ang="5400000" scaled="0"/>
-                  </a:gradFill>
-                  <a:latin typeface="+mn-lt"/>
-                  <a:ea typeface="+mn-ea"/>
-                  <a:cs typeface="+mn-cs"/>
-                </a:defRPr>
-              </a:lvl4pPr>
-              <a:lvl5pPr marL="1941513" indent="-336550" algn="l" defTabSz="914363" rtl="0" eaLnBrk="1" latinLnBrk="0" hangingPunct="1">
-                <a:lnSpc>
-                  <a:spcPct val="90000"/>
-                </a:lnSpc>
-                <a:spcBef>
-                  <a:spcPct val="20000"/>
-                </a:spcBef>
-                <a:buSzPct val="80000"/>
-                <a:buFont typeface="Arial" pitchFamily="34" charset="0"/>
-                <a:buChar char="•"/>
-                <a:defRPr sz="2000" kern="1200">
-                  <a:gradFill>
-                    <a:gsLst>
-                      <a:gs pos="0">
-                        <a:srgbClr val="595959"/>
-                      </a:gs>
-                      <a:gs pos="86000">
-                        <a:srgbClr val="595959"/>
-                      </a:gs>
-                    </a:gsLst>
-                    <a:lin ang="5400000" scaled="0"/>
-                  </a:gradFill>
-                  <a:latin typeface="+mn-lt"/>
-                  <a:ea typeface="+mn-ea"/>
-                  <a:cs typeface="+mn-cs"/>
-                </a:defRPr>
-              </a:lvl5pPr>
-              <a:lvl6pPr marL="2514499" indent="-228591" algn="l" defTabSz="914363" rtl="0" eaLnBrk="1" latinLnBrk="0" hangingPunct="1">
-                <a:spcBef>
-                  <a:spcPct val="20000"/>
-                </a:spcBef>
-                <a:buFont typeface="Arial" pitchFamily="34" charset="0"/>
-                <a:buChar char="•"/>
-                <a:defRPr sz="2000" kern="1200">
-                  <a:solidFill>
-                    <a:schemeClr val="tx1"/>
-                  </a:solidFill>
-                  <a:latin typeface="+mn-lt"/>
-                  <a:ea typeface="+mn-ea"/>
-                  <a:cs typeface="+mn-cs"/>
-                </a:defRPr>
-              </a:lvl6pPr>
-              <a:lvl7pPr marL="2971681" indent="-228591" algn="l" defTabSz="914363" rtl="0" eaLnBrk="1" latinLnBrk="0" hangingPunct="1">
-                <a:spcBef>
-                  <a:spcPct val="20000"/>
-                </a:spcBef>
-                <a:buFont typeface="Arial" pitchFamily="34" charset="0"/>
-                <a:buChar char="•"/>
-                <a:defRPr sz="2000" kern="1200">
-                  <a:solidFill>
-                    <a:schemeClr val="tx1"/>
-                  </a:solidFill>
-                  <a:latin typeface="+mn-lt"/>
-                  <a:ea typeface="+mn-ea"/>
-                  <a:cs typeface="+mn-cs"/>
-                </a:defRPr>
-              </a:lvl7pPr>
-              <a:lvl8pPr marL="3428863" indent="-228591" algn="l" defTabSz="914363" rtl="0" eaLnBrk="1" latinLnBrk="0" hangingPunct="1">
-                <a:spcBef>
-                  <a:spcPct val="20000"/>
-                </a:spcBef>
-                <a:buFont typeface="Arial" pitchFamily="34" charset="0"/>
-                <a:buChar char="•"/>
-                <a:defRPr sz="2000" kern="1200">
-                  <a:solidFill>
-                    <a:schemeClr val="tx1"/>
-                  </a:solidFill>
-                  <a:latin typeface="+mn-lt"/>
-                  <a:ea typeface="+mn-ea"/>
-                  <a:cs typeface="+mn-cs"/>
-                </a:defRPr>
-              </a:lvl8pPr>
-              <a:lvl9pPr marL="3886045" indent="-228591" algn="l" defTabSz="914363" rtl="0" eaLnBrk="1" latinLnBrk="0" hangingPunct="1">
-                <a:spcBef>
-                  <a:spcPct val="20000"/>
-                </a:spcBef>
-                <a:buFont typeface="Arial" pitchFamily="34" charset="0"/>
-                <a:buChar char="•"/>
-                <a:defRPr sz="2000" kern="1200">
-                  <a:solidFill>
-                    <a:schemeClr val="tx1"/>
-                  </a:solidFill>
-                  <a:latin typeface="+mn-lt"/>
-                  <a:ea typeface="+mn-ea"/>
-                  <a:cs typeface="+mn-cs"/>
-                </a:defRPr>
-              </a:lvl9pPr>
-            </a:lstStyle>
-            <a:p>
-              <a:pPr marL="0" indent="0" defTabSz="685864">
-                <a:spcBef>
-                  <a:spcPts val="1200"/>
-                </a:spcBef>
-                <a:buNone/>
-                <a:defRPr/>
-              </a:pPr>
-              <a:r>
-                <a:rPr lang="en-US" sz="2400" dirty="0">
-                  <a:solidFill>
-                    <a:srgbClr val="00AEEF"/>
-                  </a:solidFill>
-                  <a:latin typeface="Segoe UI"/>
-                </a:rPr>
-                <a:t>View</a:t>
-              </a:r>
-            </a:p>
-            <a:p>
-              <a:pPr marL="0" lvl="1" indent="0" defTabSz="685864">
-                <a:spcBef>
-                  <a:spcPts val="600"/>
-                </a:spcBef>
-                <a:buNone/>
-                <a:defRPr/>
-              </a:pPr>
-              <a:r>
-                <a:rPr lang="en-US" sz="2000" dirty="0">
-                  <a:solidFill>
-                    <a:schemeClr val="bg1"/>
-                  </a:solidFill>
-                  <a:latin typeface="Segoe UI"/>
-                </a:rPr>
-                <a:t>Visually represents</a:t>
-              </a:r>
-            </a:p>
-            <a:p>
-              <a:pPr marL="0" lvl="1" indent="0" defTabSz="685864">
-                <a:spcBef>
-                  <a:spcPts val="600"/>
-                </a:spcBef>
-                <a:buNone/>
-                <a:defRPr/>
-              </a:pPr>
-              <a:r>
-                <a:rPr lang="en-US" sz="2000" dirty="0">
-                  <a:solidFill>
-                    <a:schemeClr val="bg1"/>
-                  </a:solidFill>
-                  <a:latin typeface="Segoe UI"/>
-                </a:rPr>
-                <a:t>the model</a:t>
-              </a:r>
-            </a:p>
-          </p:txBody>
-        </p:sp>
-      </p:grpSp>
+            </a:prstTxWarp>
+          </a:bodyPr>
+          <a:lstStyle/>
+          <a:p>
+            <a:pPr algn="ctr" defTabSz="914099" fontAlgn="base">
+              <a:spcBef>
+                <a:spcPct val="0"/>
+              </a:spcBef>
+              <a:spcAft>
+                <a:spcPct val="0"/>
+              </a:spcAft>
+              <a:defRPr/>
+            </a:pPr>
+            <a:r>
+              <a:rPr lang="en-US" sz="2800" kern="0" dirty="0">
+                <a:gradFill>
+                  <a:gsLst>
+                    <a:gs pos="0">
+                      <a:srgbClr val="FFFFFF"/>
+                    </a:gs>
+                    <a:gs pos="100000">
+                      <a:srgbClr val="FFFFFF"/>
+                    </a:gs>
+                  </a:gsLst>
+                  <a:lin ang="5400000" scaled="0"/>
+                </a:gradFill>
+                <a:latin typeface="Segoe UI"/>
+              </a:rPr>
+              <a:t>View</a:t>
+            </a:r>
+          </a:p>
+        </p:txBody>
+      </p:sp>
       <p:sp>
         <p:nvSpPr>
           <p:cNvPr id="74" name="Right Arrow 73"/>
@@ -21936,7 +20582,7 @@
         </p:nvSpPr>
         <p:spPr bwMode="auto">
           <a:xfrm>
-            <a:off x="2057400" y="2021961"/>
+            <a:off x="3019306" y="2021961"/>
             <a:ext cx="2286000" cy="999459"/>
           </a:xfrm>
           <a:prstGeom prst="rightArrow">
@@ -21998,7 +20644,7 @@
         </p:nvSpPr>
         <p:spPr bwMode="auto">
           <a:xfrm>
-            <a:off x="2057400" y="4294578"/>
+            <a:off x="3019306" y="4294578"/>
             <a:ext cx="2286000" cy="999459"/>
           </a:xfrm>
           <a:prstGeom prst="leftArrow">
@@ -22062,7 +20708,7 @@
         </p:nvSpPr>
         <p:spPr>
           <a:xfrm>
-            <a:off x="6736509" y="3543059"/>
+            <a:off x="7698415" y="3543059"/>
             <a:ext cx="1143000" cy="396951"/>
           </a:xfrm>
           <a:prstGeom prst="rect">
@@ -22298,7 +20944,7 @@
         </p:nvSpPr>
         <p:spPr>
           <a:xfrm>
-            <a:off x="6417221" y="5469286"/>
+            <a:off x="7379127" y="5469286"/>
             <a:ext cx="1127232" cy="1015663"/>
           </a:xfrm>
           <a:prstGeom prst="rect">
@@ -22340,7 +20986,7 @@
         </p:nvSpPr>
         <p:spPr>
           <a:xfrm>
-            <a:off x="2758968" y="3480138"/>
+            <a:off x="3720874" y="3480138"/>
             <a:ext cx="1127232" cy="1015663"/>
           </a:xfrm>
           <a:prstGeom prst="rect">
@@ -22382,7 +21028,7 @@
         </p:nvSpPr>
         <p:spPr>
           <a:xfrm>
-            <a:off x="3164685" y="3741534"/>
+            <a:off x="4126591" y="3741534"/>
             <a:ext cx="949964" cy="830997"/>
           </a:xfrm>
           <a:prstGeom prst="rect">
@@ -22447,7 +21093,7 @@
                             </p:stCondLst>
                             <p:childTnLst>
                               <p:par>
-                                <p:cTn id="5" presetID="1" presetClass="entr" presetSubtype="0" fill="hold" nodeType="clickEffect">
+                                <p:cTn id="5" presetID="1" presetClass="exit" presetSubtype="0" fill="hold" grpId="0" nodeType="clickEffect">
                                   <p:stCondLst>
                                     <p:cond delay="0"/>
                                   </p:stCondLst>
@@ -22460,7 +21106,61 @@
                                           </p:stCondLst>
                                         </p:cTn>
                                         <p:tgtEl>
-                                          <p:spTgt spid="68"/>
+                                          <p:spTgt spid="60"/>
+                                        </p:tgtEl>
+                                        <p:attrNameLst>
+                                          <p:attrName>style.visibility</p:attrName>
+                                        </p:attrNameLst>
+                                      </p:cBhvr>
+                                      <p:to>
+                                        <p:strVal val="hidden"/>
+                                      </p:to>
+                                    </p:set>
+                                  </p:childTnLst>
+                                </p:cTn>
+                              </p:par>
+                              <p:par>
+                                <p:cTn id="7" presetID="1" presetClass="entr" presetSubtype="0" fill="hold" grpId="0" nodeType="withEffect">
+                                  <p:stCondLst>
+                                    <p:cond delay="0"/>
+                                  </p:stCondLst>
+                                  <p:childTnLst>
+                                    <p:set>
+                                      <p:cBhvr>
+                                        <p:cTn id="8" dur="1" fill="hold">
+                                          <p:stCondLst>
+                                            <p:cond delay="0"/>
+                                          </p:stCondLst>
+                                        </p:cTn>
+                                        <p:tgtEl>
+                                          <p:spTgt spid="74"/>
+                                        </p:tgtEl>
+                                        <p:attrNameLst>
+                                          <p:attrName>style.visibility</p:attrName>
+                                        </p:attrNameLst>
+                                      </p:cBhvr>
+                                      <p:to>
+                                        <p:strVal val="visible"/>
+                                      </p:to>
+                                    </p:set>
+                                  </p:childTnLst>
+                                </p:cTn>
+                              </p:par>
+                              <p:par>
+                                <p:cTn id="9" presetID="1" presetClass="entr" presetSubtype="0" fill="hold" grpId="0" nodeType="withEffect">
+                                  <p:stCondLst>
+                                    <p:cond delay="0"/>
+                                  </p:stCondLst>
+                                  <p:childTnLst>
+                                    <p:set>
+                                      <p:cBhvr>
+                                        <p:cTn id="10" dur="1" fill="hold">
+                                          <p:stCondLst>
+                                            <p:cond delay="0"/>
+                                          </p:stCondLst>
+                                        </p:cTn>
+                                        <p:tgtEl>
+                                          <p:spTgt spid="69"/>
                                         </p:tgtEl>
                                         <p:attrNameLst>
                                           <p:attrName>style.visibility</p:attrName>
@@ -22480,26 +21180,80 @@
                     </p:cTn>
                   </p:par>
                   <p:par>
-                    <p:cTn id="7" fill="hold">
+                    <p:cTn id="11" fill="hold">
                       <p:stCondLst>
                         <p:cond delay="indefinite"/>
                       </p:stCondLst>
                       <p:childTnLst>
                         <p:par>
-                          <p:cTn id="8" fill="hold">
+                          <p:cTn id="12" fill="hold">
                             <p:stCondLst>
                               <p:cond delay="0"/>
                             </p:stCondLst>
                             <p:childTnLst>
                               <p:par>
-                                <p:cTn id="9" presetID="1" presetClass="entr" presetSubtype="0" fill="hold" grpId="0" nodeType="clickEffect">
+                                <p:cTn id="13" presetID="1" presetClass="entr" presetSubtype="0" fill="hold" grpId="0" nodeType="clickEffect">
                                   <p:stCondLst>
                                     <p:cond delay="0"/>
                                   </p:stCondLst>
                                   <p:childTnLst>
                                     <p:set>
                                       <p:cBhvr>
-                                        <p:cTn id="10" dur="1" fill="hold">
+                                        <p:cTn id="14" dur="1" fill="hold">
+                                          <p:stCondLst>
+                                            <p:cond delay="0"/>
+                                          </p:stCondLst>
+                                        </p:cTn>
+                                        <p:tgtEl>
+                                          <p:spTgt spid="62"/>
+                                        </p:tgtEl>
+                                        <p:attrNameLst>
+                                          <p:attrName>style.visibility</p:attrName>
+                                        </p:attrNameLst>
+                                      </p:cBhvr>
+                                      <p:to>
+                                        <p:strVal val="visible"/>
+                                      </p:to>
+                                    </p:set>
+                                  </p:childTnLst>
+                                </p:cTn>
+                              </p:par>
+                              <p:par>
+                                <p:cTn id="15" presetID="1" presetClass="entr" presetSubtype="0" fill="hold" grpId="0" nodeType="withEffect">
+                                  <p:stCondLst>
+                                    <p:cond delay="0"/>
+                                  </p:stCondLst>
+                                  <p:childTnLst>
+                                    <p:set>
+                                      <p:cBhvr>
+                                        <p:cTn id="16" dur="1" fill="hold">
+                                          <p:stCondLst>
+                                            <p:cond delay="0"/>
+                                          </p:stCondLst>
+                                        </p:cTn>
+                                        <p:tgtEl>
+                                          <p:spTgt spid="63"/>
+                                        </p:tgtEl>
+                                        <p:attrNameLst>
+                                          <p:attrName>style.visibility</p:attrName>
+                                        </p:attrNameLst>
+                                      </p:cBhvr>
+                                      <p:to>
+                                        <p:strVal val="visible"/>
+                                      </p:to>
+                                    </p:set>
+                                  </p:childTnLst>
+                                </p:cTn>
+                              </p:par>
+                              <p:par>
+                                <p:cTn id="17" presetID="1" presetClass="entr" presetSubtype="0" fill="hold" grpId="0" nodeType="withEffect">
+                                  <p:stCondLst>
+                                    <p:cond delay="0"/>
+                                  </p:stCondLst>
+                                  <p:childTnLst>
+                                    <p:set>
+                                      <p:cBhvr>
+                                        <p:cTn id="18" dur="1" fill="hold">
                                           <p:stCondLst>
                                             <p:cond delay="0"/>
                                           </p:stCondLst>
@@ -22518,21 +21272,39 @@
                                   </p:childTnLst>
                                 </p:cTn>
                               </p:par>
+                            </p:childTnLst>
+                          </p:cTn>
+                        </p:par>
+                      </p:childTnLst>
+                    </p:cTn>
+                  </p:par>
+                  <p:par>
+                    <p:cTn id="19" fill="hold">
+                      <p:stCondLst>
+                        <p:cond delay="indefinite"/>
+                      </p:stCondLst>
+                      <p:childTnLst>
+                        <p:par>
+                          <p:cTn id="20" fill="hold">
+                            <p:stCondLst>
+                              <p:cond delay="0"/>
+                            </p:stCondLst>
+                            <p:childTnLst>
                               <p:par>
-                                <p:cTn id="11" presetID="1" presetClass="entr" presetSubtype="0" fill="hold" nodeType="withEffect">
+                                <p:cTn id="21" presetID="1" presetClass="entr" presetSubtype="0" fill="hold" grpId="0" nodeType="clickEffect">
                                   <p:stCondLst>
                                     <p:cond delay="0"/>
                                   </p:stCondLst>
                                   <p:childTnLst>
                                     <p:set>
                                       <p:cBhvr>
-                                        <p:cTn id="12" dur="1" fill="hold">
+                                        <p:cTn id="22" dur="1" fill="hold">
                                           <p:stCondLst>
                                             <p:cond delay="0"/>
                                           </p:stCondLst>
                                         </p:cTn>
                                         <p:tgtEl>
-                                          <p:spTgt spid="71"/>
+                                          <p:spTgt spid="66"/>
                                         </p:tgtEl>
                                         <p:attrNameLst>
                                           <p:attrName>style.visibility</p:attrName>
@@ -22546,14 +21318,68 @@
                                 </p:cTn>
                               </p:par>
                               <p:par>
-                                <p:cTn id="13" presetID="1" presetClass="entr" presetSubtype="0" fill="hold" grpId="0" nodeType="withEffect">
+                                <p:cTn id="23" presetID="1" presetClass="entr" presetSubtype="0" fill="hold" grpId="0" nodeType="withEffect">
                                   <p:stCondLst>
                                     <p:cond delay="0"/>
                                   </p:stCondLst>
                                   <p:childTnLst>
                                     <p:set>
                                       <p:cBhvr>
-                                        <p:cTn id="14" dur="1" fill="hold">
+                                        <p:cTn id="24" dur="1" fill="hold">
+                                          <p:stCondLst>
+                                            <p:cond delay="0"/>
+                                          </p:stCondLst>
+                                        </p:cTn>
+                                        <p:tgtEl>
+                                          <p:spTgt spid="67"/>
+                                        </p:tgtEl>
+                                        <p:attrNameLst>
+                                          <p:attrName>style.visibility</p:attrName>
+                                        </p:attrNameLst>
+                                      </p:cBhvr>
+                                      <p:to>
+                                        <p:strVal val="visible"/>
+                                      </p:to>
+                                    </p:set>
+                                  </p:childTnLst>
+                                </p:cTn>
+                              </p:par>
+                              <p:par>
+                                <p:cTn id="25" presetID="1" presetClass="entr" presetSubtype="0" fill="hold" grpId="0" nodeType="withEffect">
+                                  <p:stCondLst>
+                                    <p:cond delay="0"/>
+                                  </p:stCondLst>
+                                  <p:childTnLst>
+                                    <p:set>
+                                      <p:cBhvr>
+                                        <p:cTn id="26" dur="1" fill="hold">
+                                          <p:stCondLst>
+                                            <p:cond delay="0"/>
+                                          </p:stCondLst>
+                                        </p:cTn>
+                                        <p:tgtEl>
+                                          <p:spTgt spid="72"/>
+                                        </p:tgtEl>
+                                        <p:attrNameLst>
+                                          <p:attrName>style.visibility</p:attrName>
+                                        </p:attrNameLst>
+                                      </p:cBhvr>
+                                      <p:to>
+                                        <p:strVal val="visible"/>
+                                      </p:to>
+                                    </p:set>
+                                  </p:childTnLst>
+                                </p:cTn>
+                              </p:par>
+                              <p:par>
+                                <p:cTn id="27" presetID="1" presetClass="entr" presetSubtype="0" fill="hold" grpId="0" nodeType="withEffect">
+                                  <p:stCondLst>
+                                    <p:cond delay="0"/>
+                                  </p:stCondLst>
+                                  <p:childTnLst>
+                                    <p:set>
+                                      <p:cBhvr>
+                                        <p:cTn id="28" dur="1" fill="hold">
                                           <p:stCondLst>
                                             <p:cond delay="0"/>
                                           </p:stCondLst>
@@ -22579,26 +21405,26 @@
                     </p:cTn>
                   </p:par>
                   <p:par>
-                    <p:cTn id="15" fill="hold">
+                    <p:cTn id="29" fill="hold">
                       <p:stCondLst>
                         <p:cond delay="indefinite"/>
                       </p:stCondLst>
                       <p:childTnLst>
                         <p:par>
-                          <p:cTn id="16" fill="hold">
+                          <p:cTn id="30" fill="hold">
                             <p:stCondLst>
                               <p:cond delay="0"/>
                             </p:stCondLst>
                             <p:childTnLst>
                               <p:par>
-                                <p:cTn id="17" presetID="1" presetClass="entr" presetSubtype="0" fill="hold" grpId="0" nodeType="clickEffect">
+                                <p:cTn id="31" presetID="1" presetClass="entr" presetSubtype="0" fill="hold" grpId="0" nodeType="clickEffect">
                                   <p:stCondLst>
                                     <p:cond delay="0"/>
                                   </p:stCondLst>
                                   <p:childTnLst>
                                     <p:set>
                                       <p:cBhvr>
-                                        <p:cTn id="18" dur="1" fill="hold">
+                                        <p:cTn id="32" dur="1" fill="hold">
                                           <p:stCondLst>
                                             <p:cond delay="0"/>
                                           </p:stCondLst>
@@ -22618,14 +21444,14 @@
                                 </p:cTn>
                               </p:par>
                               <p:par>
-                                <p:cTn id="19" presetID="1" presetClass="entr" presetSubtype="0" fill="hold" grpId="0" nodeType="withEffect">
+                                <p:cTn id="33" presetID="1" presetClass="entr" presetSubtype="0" fill="hold" grpId="0" nodeType="withEffect">
                                   <p:stCondLst>
                                     <p:cond delay="0"/>
                                   </p:stCondLst>
                                   <p:childTnLst>
                                     <p:set>
                                       <p:cBhvr>
-                                        <p:cTn id="20" dur="1" fill="hold">
+                                        <p:cTn id="34" dur="1" fill="hold">
                                           <p:stCondLst>
                                             <p:cond delay="0"/>
                                           </p:stCondLst>
@@ -22645,14 +21471,14 @@
                                 </p:cTn>
                               </p:par>
                               <p:par>
-                                <p:cTn id="21" presetID="1" presetClass="entr" presetSubtype="0" fill="hold" grpId="0" nodeType="withEffect">
+                                <p:cTn id="35" presetID="1" presetClass="entr" presetSubtype="0" fill="hold" grpId="0" nodeType="withEffect">
                                   <p:stCondLst>
                                     <p:cond delay="0"/>
                                   </p:stCondLst>
                                   <p:childTnLst>
                                     <p:set>
                                       <p:cBhvr>
-                                        <p:cTn id="22" dur="1" fill="hold">
+                                        <p:cTn id="36" dur="1" fill="hold">
                                           <p:stCondLst>
                                             <p:cond delay="0"/>
                                           </p:stCondLst>
@@ -22699,6 +21525,14 @@
       </p:par>
     </p:tnLst>
     <p:bldLst>
+      <p:bldP spid="60" grpId="0"/>
+      <p:bldP spid="62" grpId="0" animBg="1"/>
+      <p:bldP spid="63" grpId="0" animBg="1"/>
+      <p:bldP spid="66" grpId="0" animBg="1"/>
+      <p:bldP spid="67" grpId="0" animBg="1"/>
+      <p:bldP spid="69" grpId="0" animBg="1"/>
+      <p:bldP spid="72" grpId="0" animBg="1"/>
+      <p:bldP spid="74" grpId="0" animBg="1"/>
       <p:bldP spid="76" grpId="0" animBg="1"/>
       <p:bldP spid="78" grpId="0"/>
       <p:bldP spid="3" grpId="0"/>
@@ -22782,6 +21616,13 @@
   <p:clrMapOvr>
     <a:masterClrMapping/>
   </p:clrMapOvr>
+  <p:timing>
+    <p:tnLst>
+      <p:par>
+        <p:cTn id="1" dur="indefinite" restart="never" nodeType="tmRoot"/>
+      </p:par>
+    </p:tnLst>
+  </p:timing>
 </p:sld>
 </file>
 

</xml_diff>